<commit_message>
make code testable and notes to presentation
</commit_message>
<xml_diff>
--- a/Presentation.pptx
+++ b/Presentation.pptx
@@ -3082,15 +3082,23 @@
           <a:p>
             <a:r>
               <a:rPr lang="ru-RU" dirty="0" smtClean="0"/>
-              <a:t>Источники</a:t>
+              <a:t>Я</a:t>
             </a:r>
             <a:r>
               <a:rPr lang="ru-RU" baseline="0" dirty="0" smtClean="0"/>
-              <a:t> мудрости в </a:t>
-            </a:r>
-            <a:r>
-              <a:rPr lang="en-US" baseline="0" dirty="0" smtClean="0"/>
-              <a:t>IT</a:t>
+              <a:t> раздаю книги коллегам</a:t>
+            </a:r>
+          </a:p>
+          <a:p>
+            <a:r>
+              <a:rPr lang="ru-RU" baseline="0" dirty="0" smtClean="0"/>
+              <a:t>У меня собака погрызла книгу</a:t>
+            </a:r>
+          </a:p>
+          <a:p>
+            <a:r>
+              <a:rPr lang="ru-RU" baseline="0" dirty="0" smtClean="0"/>
+              <a:t>Моя коллега носит книжку в файлике</a:t>
             </a:r>
             <a:endParaRPr lang="en-US" dirty="0"/>
           </a:p>
@@ -3176,7 +3184,7 @@
           <a:bodyPr/>
           <a:lstStyle/>
           <a:p>
-            <a:endParaRPr lang="en-US" dirty="0"/>
+            <a:endParaRPr lang="ru-RU" dirty="0"/>
           </a:p>
         </p:txBody>
       </p:sp>
@@ -3197,7 +3205,7 @@
           <a:p>
             <a:fld id="{516C5DDC-7799-4ACC-A213-90C50CBCB02D}" type="slidenum">
               <a:rPr lang="en-US" smtClean="0"/>
-              <a:t>16</a:t>
+              <a:t>14</a:t>
             </a:fld>
             <a:endParaRPr lang="en-US"/>
           </a:p>
@@ -3206,7 +3214,7 @@
     </p:spTree>
     <p:extLst>
       <p:ext uri="{BB962C8B-B14F-4D97-AF65-F5344CB8AC3E}">
-        <p14:creationId xmlns:p14="http://schemas.microsoft.com/office/powerpoint/2010/main" val="651436057"/>
+        <p14:creationId xmlns:p14="http://schemas.microsoft.com/office/powerpoint/2010/main" val="3630162557"/>
       </p:ext>
     </p:extLst>
   </p:cSld>
@@ -3260,7 +3268,7 @@
           <a:bodyPr/>
           <a:lstStyle/>
           <a:p>
-            <a:endParaRPr lang="ru-RU" dirty="0"/>
+            <a:endParaRPr lang="en-US" dirty="0"/>
           </a:p>
         </p:txBody>
       </p:sp>
@@ -3281,7 +3289,7 @@
           <a:p>
             <a:fld id="{516C5DDC-7799-4ACC-A213-90C50CBCB02D}" type="slidenum">
               <a:rPr lang="en-US" smtClean="0"/>
-              <a:t>17</a:t>
+              <a:t>16</a:t>
             </a:fld>
             <a:endParaRPr lang="en-US"/>
           </a:p>
@@ -3290,7 +3298,7 @@
     </p:spTree>
     <p:extLst>
       <p:ext uri="{BB962C8B-B14F-4D97-AF65-F5344CB8AC3E}">
-        <p14:creationId xmlns:p14="http://schemas.microsoft.com/office/powerpoint/2010/main" val="1871440519"/>
+        <p14:creationId xmlns:p14="http://schemas.microsoft.com/office/powerpoint/2010/main" val="651436057"/>
       </p:ext>
     </p:extLst>
   </p:cSld>
@@ -3344,7 +3352,7 @@
           <a:bodyPr/>
           <a:lstStyle/>
           <a:p>
-            <a:endParaRPr lang="en-US" dirty="0"/>
+            <a:endParaRPr lang="ru-RU" dirty="0"/>
           </a:p>
         </p:txBody>
       </p:sp>
@@ -3365,7 +3373,7 @@
           <a:p>
             <a:fld id="{516C5DDC-7799-4ACC-A213-90C50CBCB02D}" type="slidenum">
               <a:rPr lang="en-US" smtClean="0"/>
-              <a:t>18</a:t>
+              <a:t>17</a:t>
             </a:fld>
             <a:endParaRPr lang="en-US"/>
           </a:p>
@@ -3374,7 +3382,7 @@
     </p:spTree>
     <p:extLst>
       <p:ext uri="{BB962C8B-B14F-4D97-AF65-F5344CB8AC3E}">
-        <p14:creationId xmlns:p14="http://schemas.microsoft.com/office/powerpoint/2010/main" val="2493709556"/>
+        <p14:creationId xmlns:p14="http://schemas.microsoft.com/office/powerpoint/2010/main" val="1871440519"/>
       </p:ext>
     </p:extLst>
   </p:cSld>
@@ -3449,7 +3457,7 @@
           <a:p>
             <a:fld id="{516C5DDC-7799-4ACC-A213-90C50CBCB02D}" type="slidenum">
               <a:rPr lang="en-US" smtClean="0"/>
-              <a:t>20</a:t>
+              <a:t>18</a:t>
             </a:fld>
             <a:endParaRPr lang="en-US"/>
           </a:p>
@@ -3458,7 +3466,7 @@
     </p:spTree>
     <p:extLst>
       <p:ext uri="{BB962C8B-B14F-4D97-AF65-F5344CB8AC3E}">
-        <p14:creationId xmlns:p14="http://schemas.microsoft.com/office/powerpoint/2010/main" val="2683931491"/>
+        <p14:creationId xmlns:p14="http://schemas.microsoft.com/office/powerpoint/2010/main" val="2493709556"/>
       </p:ext>
     </p:extLst>
   </p:cSld>
@@ -3533,7 +3541,7 @@
           <a:p>
             <a:fld id="{516C5DDC-7799-4ACC-A213-90C50CBCB02D}" type="slidenum">
               <a:rPr lang="en-US" smtClean="0"/>
-              <a:t>21</a:t>
+              <a:t>20</a:t>
             </a:fld>
             <a:endParaRPr lang="en-US"/>
           </a:p>
@@ -3542,7 +3550,7 @@
     </p:spTree>
     <p:extLst>
       <p:ext uri="{BB962C8B-B14F-4D97-AF65-F5344CB8AC3E}">
-        <p14:creationId xmlns:p14="http://schemas.microsoft.com/office/powerpoint/2010/main" val="1251983408"/>
+        <p14:creationId xmlns:p14="http://schemas.microsoft.com/office/powerpoint/2010/main" val="2683931491"/>
       </p:ext>
     </p:extLst>
   </p:cSld>
@@ -3617,7 +3625,7 @@
           <a:p>
             <a:fld id="{516C5DDC-7799-4ACC-A213-90C50CBCB02D}" type="slidenum">
               <a:rPr lang="en-US" smtClean="0"/>
-              <a:t>23</a:t>
+              <a:t>21</a:t>
             </a:fld>
             <a:endParaRPr lang="en-US"/>
           </a:p>
@@ -3626,7 +3634,7 @@
     </p:spTree>
     <p:extLst>
       <p:ext uri="{BB962C8B-B14F-4D97-AF65-F5344CB8AC3E}">
-        <p14:creationId xmlns:p14="http://schemas.microsoft.com/office/powerpoint/2010/main" val="3920638634"/>
+        <p14:creationId xmlns:p14="http://schemas.microsoft.com/office/powerpoint/2010/main" val="1251983408"/>
       </p:ext>
     </p:extLst>
   </p:cSld>
@@ -3701,7 +3709,7 @@
           <a:p>
             <a:fld id="{516C5DDC-7799-4ACC-A213-90C50CBCB02D}" type="slidenum">
               <a:rPr lang="en-US" smtClean="0"/>
-              <a:t>24</a:t>
+              <a:t>23</a:t>
             </a:fld>
             <a:endParaRPr lang="en-US"/>
           </a:p>
@@ -3710,7 +3718,7 @@
     </p:spTree>
     <p:extLst>
       <p:ext uri="{BB962C8B-B14F-4D97-AF65-F5344CB8AC3E}">
-        <p14:creationId xmlns:p14="http://schemas.microsoft.com/office/powerpoint/2010/main" val="4005419235"/>
+        <p14:creationId xmlns:p14="http://schemas.microsoft.com/office/powerpoint/2010/main" val="3920638634"/>
       </p:ext>
     </p:extLst>
   </p:cSld>
@@ -3785,7 +3793,7 @@
           <a:p>
             <a:fld id="{516C5DDC-7799-4ACC-A213-90C50CBCB02D}" type="slidenum">
               <a:rPr lang="en-US" smtClean="0"/>
-              <a:t>26</a:t>
+              <a:t>24</a:t>
             </a:fld>
             <a:endParaRPr lang="en-US"/>
           </a:p>
@@ -3794,7 +3802,7 @@
     </p:spTree>
     <p:extLst>
       <p:ext uri="{BB962C8B-B14F-4D97-AF65-F5344CB8AC3E}">
-        <p14:creationId xmlns:p14="http://schemas.microsoft.com/office/powerpoint/2010/main" val="3050276223"/>
+        <p14:creationId xmlns:p14="http://schemas.microsoft.com/office/powerpoint/2010/main" val="4005419235"/>
       </p:ext>
     </p:extLst>
   </p:cSld>
@@ -3869,7 +3877,7 @@
           <a:p>
             <a:fld id="{516C5DDC-7799-4ACC-A213-90C50CBCB02D}" type="slidenum">
               <a:rPr lang="en-US" smtClean="0"/>
-              <a:t>27</a:t>
+              <a:t>26</a:t>
             </a:fld>
             <a:endParaRPr lang="en-US"/>
           </a:p>
@@ -3878,7 +3886,7 @@
     </p:spTree>
     <p:extLst>
       <p:ext uri="{BB962C8B-B14F-4D97-AF65-F5344CB8AC3E}">
-        <p14:creationId xmlns:p14="http://schemas.microsoft.com/office/powerpoint/2010/main" val="2720547197"/>
+        <p14:creationId xmlns:p14="http://schemas.microsoft.com/office/powerpoint/2010/main" val="3050276223"/>
       </p:ext>
     </p:extLst>
   </p:cSld>
@@ -3953,7 +3961,7 @@
           <a:p>
             <a:fld id="{516C5DDC-7799-4ACC-A213-90C50CBCB02D}" type="slidenum">
               <a:rPr lang="en-US" smtClean="0"/>
-              <a:t>28</a:t>
+              <a:t>27</a:t>
             </a:fld>
             <a:endParaRPr lang="en-US"/>
           </a:p>
@@ -3962,7 +3970,7 @@
     </p:spTree>
     <p:extLst>
       <p:ext uri="{BB962C8B-B14F-4D97-AF65-F5344CB8AC3E}">
-        <p14:creationId xmlns:p14="http://schemas.microsoft.com/office/powerpoint/2010/main" val="1570735884"/>
+        <p14:creationId xmlns:p14="http://schemas.microsoft.com/office/powerpoint/2010/main" val="2720547197"/>
       </p:ext>
     </p:extLst>
   </p:cSld>
@@ -4016,7 +4024,31 @@
           <a:bodyPr/>
           <a:lstStyle/>
           <a:p>
-            <a:endParaRPr lang="en-US" dirty="0"/>
+            <a:r>
+              <a:rPr lang="ru-RU" dirty="0" smtClean="0"/>
+              <a:t>Я буду часто оговариваться</a:t>
+            </a:r>
+            <a:r>
+              <a:rPr lang="ru-RU" baseline="0" dirty="0" smtClean="0"/>
+              <a:t> и говорить про </a:t>
+            </a:r>
+            <a:r>
+              <a:rPr lang="en-US" baseline="0" dirty="0" err="1" smtClean="0"/>
+              <a:t>readonly</a:t>
+            </a:r>
+            <a:r>
+              <a:rPr lang="en-US" baseline="0" dirty="0" smtClean="0"/>
+              <a:t> </a:t>
+            </a:r>
+            <a:r>
+              <a:rPr lang="ru-RU" baseline="0" dirty="0" smtClean="0"/>
+              <a:t>в контексте </a:t>
+            </a:r>
+            <a:r>
+              <a:rPr lang="en-US" baseline="0" dirty="0" smtClean="0"/>
+              <a:t>immutability</a:t>
+            </a:r>
+            <a:endParaRPr lang="ru-RU" dirty="0"/>
           </a:p>
         </p:txBody>
       </p:sp>
@@ -4037,7 +4069,7 @@
           <a:p>
             <a:fld id="{516C5DDC-7799-4ACC-A213-90C50CBCB02D}" type="slidenum">
               <a:rPr lang="en-US" smtClean="0"/>
-              <a:t>4</a:t>
+              <a:t>3</a:t>
             </a:fld>
             <a:endParaRPr lang="en-US"/>
           </a:p>
@@ -4046,7 +4078,7 @@
     </p:spTree>
     <p:extLst>
       <p:ext uri="{BB962C8B-B14F-4D97-AF65-F5344CB8AC3E}">
-        <p14:creationId xmlns:p14="http://schemas.microsoft.com/office/powerpoint/2010/main" val="905343077"/>
+        <p14:creationId xmlns:p14="http://schemas.microsoft.com/office/powerpoint/2010/main" val="4155003972"/>
       </p:ext>
     </p:extLst>
   </p:cSld>
@@ -4121,6 +4153,90 @@
           <a:p>
             <a:fld id="{516C5DDC-7799-4ACC-A213-90C50CBCB02D}" type="slidenum">
               <a:rPr lang="en-US" smtClean="0"/>
+              <a:t>28</a:t>
+            </a:fld>
+            <a:endParaRPr lang="en-US"/>
+          </a:p>
+        </p:txBody>
+      </p:sp>
+    </p:spTree>
+    <p:extLst>
+      <p:ext uri="{BB962C8B-B14F-4D97-AF65-F5344CB8AC3E}">
+        <p14:creationId xmlns:p14="http://schemas.microsoft.com/office/powerpoint/2010/main" val="1570735884"/>
+      </p:ext>
+    </p:extLst>
+  </p:cSld>
+  <p:clrMapOvr>
+    <a:masterClrMapping/>
+  </p:clrMapOvr>
+</p:notes>
+</file>
+
+<file path=ppt/notesSlides/notesSlide21.xml><?xml version="1.0" encoding="utf-8"?>
+<p:notes xmlns:a="http://schemas.openxmlformats.org/drawingml/2006/main" xmlns:r="http://schemas.openxmlformats.org/officeDocument/2006/relationships" xmlns:p="http://schemas.openxmlformats.org/presentationml/2006/main">
+  <p:cSld>
+    <p:spTree>
+      <p:nvGrpSpPr>
+        <p:cNvPr id="1" name=""/>
+        <p:cNvGrpSpPr/>
+        <p:nvPr/>
+      </p:nvGrpSpPr>
+      <p:grpSpPr>
+        <a:xfrm>
+          <a:off x="0" y="0"/>
+          <a:ext cx="0" cy="0"/>
+          <a:chOff x="0" y="0"/>
+          <a:chExt cx="0" cy="0"/>
+        </a:xfrm>
+      </p:grpSpPr>
+      <p:sp>
+        <p:nvSpPr>
+          <p:cNvPr id="2" name="Slide Image Placeholder 1"/>
+          <p:cNvSpPr>
+            <a:spLocks noGrp="1" noRot="1" noChangeAspect="1"/>
+          </p:cNvSpPr>
+          <p:nvPr>
+            <p:ph type="sldImg"/>
+          </p:nvPr>
+        </p:nvSpPr>
+        <p:spPr/>
+      </p:sp>
+      <p:sp>
+        <p:nvSpPr>
+          <p:cNvPr id="3" name="Notes Placeholder 2"/>
+          <p:cNvSpPr>
+            <a:spLocks noGrp="1"/>
+          </p:cNvSpPr>
+          <p:nvPr>
+            <p:ph type="body" idx="1"/>
+          </p:nvPr>
+        </p:nvSpPr>
+        <p:spPr/>
+        <p:txBody>
+          <a:bodyPr/>
+          <a:lstStyle/>
+          <a:p>
+            <a:endParaRPr lang="en-US" dirty="0"/>
+          </a:p>
+        </p:txBody>
+      </p:sp>
+      <p:sp>
+        <p:nvSpPr>
+          <p:cNvPr id="4" name="Slide Number Placeholder 3"/>
+          <p:cNvSpPr>
+            <a:spLocks noGrp="1"/>
+          </p:cNvSpPr>
+          <p:nvPr>
+            <p:ph type="sldNum" sz="quarter" idx="10"/>
+          </p:nvPr>
+        </p:nvSpPr>
+        <p:spPr/>
+        <p:txBody>
+          <a:bodyPr/>
+          <a:lstStyle/>
+          <a:p>
+            <a:fld id="{516C5DDC-7799-4ACC-A213-90C50CBCB02D}" type="slidenum">
+              <a:rPr lang="en-US" smtClean="0"/>
               <a:t>36</a:t>
             </a:fld>
             <a:endParaRPr lang="en-US"/>
@@ -4140,7 +4256,7 @@
 </p:notes>
 </file>
 
-<file path=ppt/notesSlides/notesSlide21.xml><?xml version="1.0" encoding="utf-8"?>
+<file path=ppt/notesSlides/notesSlide22.xml><?xml version="1.0" encoding="utf-8"?>
 <p:notes xmlns:a="http://schemas.openxmlformats.org/drawingml/2006/main" xmlns:r="http://schemas.openxmlformats.org/officeDocument/2006/relationships" xmlns:p="http://schemas.openxmlformats.org/presentationml/2006/main">
   <p:cSld>
     <p:spTree>
@@ -4354,7 +4470,7 @@
           <a:bodyPr/>
           <a:lstStyle/>
           <a:p>
-            <a:endParaRPr lang="ru-RU" dirty="0"/>
+            <a:endParaRPr lang="en-US" dirty="0"/>
           </a:p>
         </p:txBody>
       </p:sp>
@@ -4375,7 +4491,7 @@
           <a:p>
             <a:fld id="{516C5DDC-7799-4ACC-A213-90C50CBCB02D}" type="slidenum">
               <a:rPr lang="en-US" smtClean="0"/>
-              <a:t>7</a:t>
+              <a:t>4</a:t>
             </a:fld>
             <a:endParaRPr lang="en-US"/>
           </a:p>
@@ -4384,7 +4500,7 @@
     </p:spTree>
     <p:extLst>
       <p:ext uri="{BB962C8B-B14F-4D97-AF65-F5344CB8AC3E}">
-        <p14:creationId xmlns:p14="http://schemas.microsoft.com/office/powerpoint/2010/main" val="1792474972"/>
+        <p14:creationId xmlns:p14="http://schemas.microsoft.com/office/powerpoint/2010/main" val="905343077"/>
       </p:ext>
     </p:extLst>
   </p:cSld>
@@ -4438,7 +4554,7 @@
           <a:bodyPr/>
           <a:lstStyle/>
           <a:p>
-            <a:endParaRPr lang="en-US" dirty="0"/>
+            <a:endParaRPr lang="ru-RU" dirty="0"/>
           </a:p>
         </p:txBody>
       </p:sp>
@@ -4459,7 +4575,7 @@
           <a:p>
             <a:fld id="{516C5DDC-7799-4ACC-A213-90C50CBCB02D}" type="slidenum">
               <a:rPr lang="en-US" smtClean="0"/>
-              <a:t>8</a:t>
+              <a:t>7</a:t>
             </a:fld>
             <a:endParaRPr lang="en-US"/>
           </a:p>
@@ -4468,7 +4584,7 @@
     </p:spTree>
     <p:extLst>
       <p:ext uri="{BB962C8B-B14F-4D97-AF65-F5344CB8AC3E}">
-        <p14:creationId xmlns:p14="http://schemas.microsoft.com/office/powerpoint/2010/main" val="3948139063"/>
+        <p14:creationId xmlns:p14="http://schemas.microsoft.com/office/powerpoint/2010/main" val="1792474972"/>
       </p:ext>
     </p:extLst>
   </p:cSld>
@@ -4543,7 +4659,7 @@
           <a:p>
             <a:fld id="{516C5DDC-7799-4ACC-A213-90C50CBCB02D}" type="slidenum">
               <a:rPr lang="en-US" smtClean="0"/>
-              <a:t>9</a:t>
+              <a:t>8</a:t>
             </a:fld>
             <a:endParaRPr lang="en-US"/>
           </a:p>
@@ -4552,7 +4668,7 @@
     </p:spTree>
     <p:extLst>
       <p:ext uri="{BB962C8B-B14F-4D97-AF65-F5344CB8AC3E}">
-        <p14:creationId xmlns:p14="http://schemas.microsoft.com/office/powerpoint/2010/main" val="2525185904"/>
+        <p14:creationId xmlns:p14="http://schemas.microsoft.com/office/powerpoint/2010/main" val="3948139063"/>
       </p:ext>
     </p:extLst>
   </p:cSld>
@@ -4627,7 +4743,7 @@
           <a:p>
             <a:fld id="{516C5DDC-7799-4ACC-A213-90C50CBCB02D}" type="slidenum">
               <a:rPr lang="en-US" smtClean="0"/>
-              <a:t>10</a:t>
+              <a:t>9</a:t>
             </a:fld>
             <a:endParaRPr lang="en-US"/>
           </a:p>
@@ -4636,7 +4752,7 @@
     </p:spTree>
     <p:extLst>
       <p:ext uri="{BB962C8B-B14F-4D97-AF65-F5344CB8AC3E}">
-        <p14:creationId xmlns:p14="http://schemas.microsoft.com/office/powerpoint/2010/main" val="1063470018"/>
+        <p14:creationId xmlns:p14="http://schemas.microsoft.com/office/powerpoint/2010/main" val="2525185904"/>
       </p:ext>
     </p:extLst>
   </p:cSld>
@@ -4690,100 +4806,7 @@
           <a:bodyPr/>
           <a:lstStyle/>
           <a:p>
-            <a:pPr marL="0" indent="0">
-              <a:buFontTx/>
-              <a:buNone/>
-            </a:pPr>
-            <a:r>
-              <a:rPr lang="en-US" dirty="0" smtClean="0"/>
-              <a:t>- </a:t>
-            </a:r>
-            <a:r>
-              <a:rPr lang="ru-RU" dirty="0" smtClean="0"/>
-              <a:t>Проверка</a:t>
-            </a:r>
-            <a:r>
-              <a:rPr lang="ru-RU" baseline="0" dirty="0" smtClean="0"/>
-              <a:t> в </a:t>
-            </a:r>
-            <a:r>
-              <a:rPr lang="en-US" baseline="0" dirty="0" smtClean="0"/>
-              <a:t>compile time</a:t>
-            </a:r>
-            <a:endParaRPr lang="en-US" dirty="0" smtClean="0"/>
-          </a:p>
-          <a:p>
-            <a:pPr marL="0" indent="0">
-              <a:buFontTx/>
-              <a:buNone/>
-            </a:pPr>
-            <a:r>
-              <a:rPr lang="en-US" dirty="0" smtClean="0"/>
-              <a:t>- </a:t>
-            </a:r>
-            <a:r>
-              <a:rPr lang="ru-RU" dirty="0" smtClean="0"/>
-              <a:t>Много</a:t>
-            </a:r>
-            <a:r>
-              <a:rPr lang="ru-RU" baseline="0" dirty="0" smtClean="0"/>
-              <a:t> аргументов в конструкторе</a:t>
-            </a:r>
-            <a:endParaRPr lang="en-US" dirty="0" smtClean="0"/>
-          </a:p>
-          <a:p>
-            <a:pPr marL="0" indent="0">
-              <a:buFontTx/>
-              <a:buNone/>
-            </a:pPr>
-            <a:r>
-              <a:rPr lang="en-US" dirty="0" smtClean="0"/>
-              <a:t>- </a:t>
-            </a:r>
-            <a:r>
-              <a:rPr lang="ru-RU" dirty="0" smtClean="0"/>
-              <a:t>Сериализация</a:t>
-            </a:r>
-            <a:r>
-              <a:rPr lang="ru-RU" baseline="0" dirty="0" smtClean="0"/>
-              <a:t> </a:t>
-            </a:r>
-            <a:endParaRPr lang="en-US" baseline="0" dirty="0" smtClean="0"/>
-          </a:p>
-          <a:p>
-            <a:pPr marL="0" indent="0">
-              <a:buFontTx/>
-              <a:buNone/>
-            </a:pPr>
-            <a:r>
-              <a:rPr lang="en-US" baseline="0" dirty="0" smtClean="0"/>
-              <a:t>- Entity Framework</a:t>
-            </a:r>
-          </a:p>
-          <a:p>
-            <a:r>
-              <a:rPr lang="en-US" dirty="0" smtClean="0"/>
-              <a:t>+ Simple</a:t>
-            </a:r>
-          </a:p>
-          <a:p>
-            <a:r>
-              <a:rPr lang="en-US" dirty="0" smtClean="0"/>
-              <a:t>+</a:t>
-            </a:r>
-            <a:r>
-              <a:rPr lang="en-US" baseline="0" dirty="0" smtClean="0"/>
-              <a:t> </a:t>
-            </a:r>
-            <a:r>
-              <a:rPr lang="en-US" baseline="0" dirty="0" err="1" smtClean="0"/>
-              <a:t>Automapper</a:t>
-            </a:r>
-            <a:r>
-              <a:rPr lang="en-US" baseline="0" dirty="0" smtClean="0"/>
-              <a:t> can</a:t>
-            </a:r>
-            <a:endParaRPr lang="en-US" dirty="0" smtClean="0"/>
+            <a:endParaRPr lang="en-US" dirty="0"/>
           </a:p>
         </p:txBody>
       </p:sp>
@@ -4804,7 +4827,7 @@
           <a:p>
             <a:fld id="{516C5DDC-7799-4ACC-A213-90C50CBCB02D}" type="slidenum">
               <a:rPr lang="en-US" smtClean="0"/>
-              <a:t>11</a:t>
+              <a:t>10</a:t>
             </a:fld>
             <a:endParaRPr lang="en-US"/>
           </a:p>
@@ -4813,7 +4836,7 @@
     </p:spTree>
     <p:extLst>
       <p:ext uri="{BB962C8B-B14F-4D97-AF65-F5344CB8AC3E}">
-        <p14:creationId xmlns:p14="http://schemas.microsoft.com/office/powerpoint/2010/main" val="838380362"/>
+        <p14:creationId xmlns:p14="http://schemas.microsoft.com/office/powerpoint/2010/main" val="1063470018"/>
       </p:ext>
     </p:extLst>
   </p:cSld>
@@ -4867,46 +4890,11 @@
           <a:bodyPr/>
           <a:lstStyle/>
           <a:p>
-            <a:pPr marL="0" marR="0" lvl="0" indent="0" algn="l" defTabSz="914400" rtl="0" eaLnBrk="1" fontAlgn="auto" latinLnBrk="0" hangingPunct="1">
-              <a:lnSpc>
-                <a:spcPct val="100000"/>
-              </a:lnSpc>
-              <a:spcBef>
-                <a:spcPts val="0"/>
-              </a:spcBef>
-              <a:spcAft>
-                <a:spcPts val="0"/>
-              </a:spcAft>
-              <a:buClrTx/>
-              <a:buSzTx/>
+            <a:pPr marL="0" indent="0">
               <a:buFontTx/>
               <a:buNone/>
-              <a:tabLst/>
-              <a:defRPr/>
-            </a:pPr>
-            <a:r>
-              <a:rPr lang="en-US" dirty="0" smtClean="0"/>
-              <a:t>+ </a:t>
-            </a:r>
-            <a:r>
-              <a:rPr lang="en-US" dirty="0" err="1" smtClean="0"/>
-              <a:t>Popsticle</a:t>
-            </a:r>
-            <a:r>
-              <a:rPr lang="en-US" dirty="0" smtClean="0"/>
-              <a:t> immutability</a:t>
-            </a:r>
-          </a:p>
-          <a:p>
-            <a:r>
-              <a:rPr lang="en-US" dirty="0" smtClean="0"/>
-              <a:t>+ POCO</a:t>
-            </a:r>
-            <a:r>
-              <a:rPr lang="en-US" baseline="0" dirty="0" smtClean="0"/>
-              <a:t> class</a:t>
-            </a:r>
-            <a:endParaRPr lang="en-US" dirty="0"/>
+            </a:pPr>
+            <a:endParaRPr lang="en-US" dirty="0" smtClean="0"/>
           </a:p>
         </p:txBody>
       </p:sp>
@@ -4927,7 +4915,7 @@
           <a:p>
             <a:fld id="{516C5DDC-7799-4ACC-A213-90C50CBCB02D}" type="slidenum">
               <a:rPr lang="en-US" smtClean="0"/>
-              <a:t>13</a:t>
+              <a:t>11</a:t>
             </a:fld>
             <a:endParaRPr lang="en-US"/>
           </a:p>
@@ -4936,7 +4924,7 @@
     </p:spTree>
     <p:extLst>
       <p:ext uri="{BB962C8B-B14F-4D97-AF65-F5344CB8AC3E}">
-        <p14:creationId xmlns:p14="http://schemas.microsoft.com/office/powerpoint/2010/main" val="1434091891"/>
+        <p14:creationId xmlns:p14="http://schemas.microsoft.com/office/powerpoint/2010/main" val="838380362"/>
       </p:ext>
     </p:extLst>
   </p:cSld>
@@ -4990,11 +4978,24 @@
           <a:bodyPr/>
           <a:lstStyle/>
           <a:p>
-            <a:r>
-              <a:rPr lang="en-US" dirty="0" smtClean="0"/>
-              <a:t>- No compile time</a:t>
-            </a:r>
-            <a:endParaRPr lang="ru-RU" dirty="0"/>
+            <a:pPr marL="0" marR="0" lvl="0" indent="0" algn="l" defTabSz="914400" rtl="0" eaLnBrk="1" fontAlgn="auto" latinLnBrk="0" hangingPunct="1">
+              <a:lnSpc>
+                <a:spcPct val="100000"/>
+              </a:lnSpc>
+              <a:spcBef>
+                <a:spcPts val="0"/>
+              </a:spcBef>
+              <a:spcAft>
+                <a:spcPts val="0"/>
+              </a:spcAft>
+              <a:buClrTx/>
+              <a:buSzTx/>
+              <a:buFontTx/>
+              <a:buNone/>
+              <a:tabLst/>
+              <a:defRPr/>
+            </a:pPr>
+            <a:endParaRPr lang="en-US" dirty="0"/>
           </a:p>
         </p:txBody>
       </p:sp>
@@ -5015,7 +5016,7 @@
           <a:p>
             <a:fld id="{516C5DDC-7799-4ACC-A213-90C50CBCB02D}" type="slidenum">
               <a:rPr lang="en-US" smtClean="0"/>
-              <a:t>14</a:t>
+              <a:t>13</a:t>
             </a:fld>
             <a:endParaRPr lang="en-US"/>
           </a:p>
@@ -5024,7 +5025,7 @@
     </p:spTree>
     <p:extLst>
       <p:ext uri="{BB962C8B-B14F-4D97-AF65-F5344CB8AC3E}">
-        <p14:creationId xmlns:p14="http://schemas.microsoft.com/office/powerpoint/2010/main" val="3630162557"/>
+        <p14:creationId xmlns:p14="http://schemas.microsoft.com/office/powerpoint/2010/main" val="1434091891"/>
       </p:ext>
     </p:extLst>
   </p:cSld>
@@ -15677,6 +15678,13 @@
   <p:clrMapOvr>
     <a:masterClrMapping/>
   </p:clrMapOvr>
+  <p:timing>
+    <p:tnLst>
+      <p:par>
+        <p:cTn id="1" dur="indefinite" restart="never" nodeType="tmRoot"/>
+      </p:par>
+    </p:tnLst>
+  </p:timing>
 </p:sld>
 </file>
 

</xml_diff>

<commit_message>
apply template to presentation
</commit_message>
<xml_diff>
--- a/Presentation.pptx
+++ b/Presentation.pptx
@@ -2769,7 +2769,7 @@
           <a:p>
             <a:fld id="{E8677973-4C7D-4B32-A1AE-9D6A9A1BEB65}" type="datetimeFigureOut">
               <a:rPr lang="en-US" smtClean="0"/>
-              <a:t>5/19/2018</a:t>
+              <a:t>5/20/2018</a:t>
             </a:fld>
             <a:endParaRPr lang="en-US"/>
           </a:p>
@@ -5190,7 +5190,7 @@
           <a:p>
             <a:fld id="{A3080D3A-A941-4AD9-841B-3309D54C6E0D}" type="datetime1">
               <a:rPr lang="en-US" smtClean="0"/>
-              <a:t>5/19/2018</a:t>
+              <a:t>5/20/2018</a:t>
             </a:fld>
             <a:endParaRPr lang="en-US"/>
           </a:p>
@@ -5388,7 +5388,7 @@
           <a:p>
             <a:fld id="{78963F58-0520-42B6-8BEC-FA74DE52E84A}" type="datetime1">
               <a:rPr lang="en-US" smtClean="0"/>
-              <a:t>5/19/2018</a:t>
+              <a:t>5/20/2018</a:t>
             </a:fld>
             <a:endParaRPr lang="en-US"/>
           </a:p>
@@ -5596,7 +5596,7 @@
           <a:p>
             <a:fld id="{1E0741F7-5606-4EF4-BBF2-2E583FB4696B}" type="datetime1">
               <a:rPr lang="en-US" smtClean="0"/>
-              <a:t>5/19/2018</a:t>
+              <a:t>5/20/2018</a:t>
             </a:fld>
             <a:endParaRPr lang="en-US"/>
           </a:p>
@@ -5794,7 +5794,7 @@
           <a:p>
             <a:fld id="{8A243E26-5328-4A3E-9742-86E8E5618FB9}" type="datetime1">
               <a:rPr lang="en-US" smtClean="0"/>
-              <a:t>5/19/2018</a:t>
+              <a:t>5/20/2018</a:t>
             </a:fld>
             <a:endParaRPr lang="en-US"/>
           </a:p>
@@ -6069,7 +6069,7 @@
           <a:p>
             <a:fld id="{79F3BB67-8FEA-42EA-BE41-1C0C499F6715}" type="datetime1">
               <a:rPr lang="en-US" smtClean="0"/>
-              <a:t>5/19/2018</a:t>
+              <a:t>5/20/2018</a:t>
             </a:fld>
             <a:endParaRPr lang="en-US"/>
           </a:p>
@@ -6334,7 +6334,7 @@
           <a:p>
             <a:fld id="{3C5F631E-1ED2-4508-8511-18A4F93AB530}" type="datetime1">
               <a:rPr lang="en-US" smtClean="0"/>
-              <a:t>5/19/2018</a:t>
+              <a:t>5/20/2018</a:t>
             </a:fld>
             <a:endParaRPr lang="en-US"/>
           </a:p>
@@ -6746,7 +6746,7 @@
           <a:p>
             <a:fld id="{4A147336-6269-4B5B-981C-D66BB990C237}" type="datetime1">
               <a:rPr lang="en-US" smtClean="0"/>
-              <a:t>5/19/2018</a:t>
+              <a:t>5/20/2018</a:t>
             </a:fld>
             <a:endParaRPr lang="en-US"/>
           </a:p>
@@ -6887,7 +6887,7 @@
           <a:p>
             <a:fld id="{F51CFDBD-456D-49E1-AB6F-9E02C6121DD3}" type="datetime1">
               <a:rPr lang="en-US" smtClean="0"/>
-              <a:t>5/19/2018</a:t>
+              <a:t>5/20/2018</a:t>
             </a:fld>
             <a:endParaRPr lang="en-US"/>
           </a:p>
@@ -7000,7 +7000,7 @@
           <a:p>
             <a:fld id="{4DE7A270-92EF-4670-8B83-FDF43736C09D}" type="datetime1">
               <a:rPr lang="en-US" smtClean="0"/>
-              <a:t>5/19/2018</a:t>
+              <a:t>5/20/2018</a:t>
             </a:fld>
             <a:endParaRPr lang="en-US"/>
           </a:p>
@@ -7311,7 +7311,7 @@
           <a:p>
             <a:fld id="{BAD4F61B-83FC-4661-82EB-A269331ECF46}" type="datetime1">
               <a:rPr lang="en-US" smtClean="0"/>
-              <a:t>5/19/2018</a:t>
+              <a:t>5/20/2018</a:t>
             </a:fld>
             <a:endParaRPr lang="en-US"/>
           </a:p>
@@ -7599,7 +7599,7 @@
           <a:p>
             <a:fld id="{320A9D37-F2C2-466D-8885-FC3D2A009462}" type="datetime1">
               <a:rPr lang="en-US" smtClean="0"/>
-              <a:t>5/19/2018</a:t>
+              <a:t>5/20/2018</a:t>
             </a:fld>
             <a:endParaRPr lang="en-US"/>
           </a:p>
@@ -7840,7 +7840,7 @@
           <a:p>
             <a:fld id="{784CA7B1-FDE6-4A69-BC76-07B9AE315539}" type="datetime1">
               <a:rPr lang="en-US" smtClean="0"/>
-              <a:t>5/19/2018</a:t>
+              <a:t>5/20/2018</a:t>
             </a:fld>
             <a:endParaRPr lang="en-US"/>
           </a:p>
@@ -15440,13 +15440,8 @@
           <a:p>
             <a:r>
               <a:rPr lang="en-US" dirty="0" smtClean="0"/>
-              <a:t>We can use mutable POCO classes</a:t>
-            </a:r>
-            <a:r>
-              <a:rPr lang="en-US" dirty="0" smtClean="0"/>
-              <a:t>!!!</a:t>
-            </a:r>
-            <a:endParaRPr lang="en-US" dirty="0" smtClean="0"/>
+              <a:t>We can use mutable POCO classes!!!</a:t>
+            </a:r>
           </a:p>
         </p:txBody>
       </p:sp>
@@ -18151,7 +18146,6 @@
               <a:rPr lang="en-US" dirty="0" smtClean="0"/>
               <a:t>Required code review</a:t>
             </a:r>
-            <a:endParaRPr lang="en-US" dirty="0" smtClean="0"/>
           </a:p>
         </p:txBody>
       </p:sp>
@@ -27932,7 +27926,6 @@
               <a:rPr lang="en-US" dirty="0"/>
               <a:t>Eric Lippert:</a:t>
             </a:r>
-            <a:endParaRPr lang="en-US" dirty="0"/>
           </a:p>
           <a:p>
             <a:pPr lvl="1"/>
@@ -28519,7 +28512,15 @@
           <a:p>
             <a:r>
               <a:rPr lang="en-US" sz="4000" dirty="0"/>
-              <a:t>Avoiding unexpected changes in huge code base</a:t>
+              <a:t>Avoiding unexpected changes </a:t>
+            </a:r>
+            <a:r>
+              <a:rPr lang="en-US" sz="4000" dirty="0" smtClean="0"/>
+              <a:t>in a </a:t>
+            </a:r>
+            <a:r>
+              <a:rPr lang="en-US" sz="4000" dirty="0"/>
+              <a:t>huge code base</a:t>
             </a:r>
             <a:endParaRPr lang="ru-RU" sz="4000" dirty="0"/>
           </a:p>

</xml_diff>